<commit_message>
Commenting and removed some legacy functions
</commit_message>
<xml_diff>
--- a/Project diagram.pptx
+++ b/Project diagram.pptx
@@ -104,15 +104,12 @@
       </a:defRPr>
     </a:lvl9pPr>
   </p:defaultTextStyle>
+  <p:extLst>
+    <p:ext uri="{EFAFB233-063F-42B5-8137-9DF3F51BA10A}">
+      <p15:sldGuideLst xmlns:p15="http://schemas.microsoft.com/office/powerpoint/2012/main"/>
+    </p:ext>
+  </p:extLst>
 </p:presentation>
-</file>
-
-<file path=ppt/revisionInfo.xml><?xml version="1.0" encoding="utf-8"?>
-<p1510:revInfo xmlns:a="http://schemas.openxmlformats.org/drawingml/2006/main" xmlns:r="http://schemas.openxmlformats.org/officeDocument/2006/relationships" xmlns:p1510="http://schemas.microsoft.com/office/powerpoint/2015/10/main">
-  <p1510:revLst>
-    <p1510:client id="{F7DE35B7-C3DB-495E-96FD-8F8E9C305FE8}" v="9" dt="2020-10-07T23:59:05.202"/>
-  </p1510:revLst>
-</p1510:revInfo>
 </file>
 
 <file path=ppt/changesInfos/changesInfo1.xml><?xml version="1.0" encoding="utf-8"?>
@@ -253,6 +250,30 @@
       </pc:sldChg>
     </pc:docChg>
   </pc:docChgLst>
+  <pc:docChgLst>
+    <pc:chgData name="Lachlan Court" userId="d42660897f176d1e" providerId="LiveId" clId="{4ADD2832-70EE-475C-B958-C27AE34837E1}"/>
+    <pc:docChg chg="custSel modSld">
+      <pc:chgData name="Lachlan Court" userId="d42660897f176d1e" providerId="LiveId" clId="{4ADD2832-70EE-475C-B958-C27AE34837E1}" dt="2020-10-11T23:08:47.883" v="3" actId="20577"/>
+      <pc:docMkLst>
+        <pc:docMk/>
+      </pc:docMkLst>
+      <pc:sldChg chg="modSp mod">
+        <pc:chgData name="Lachlan Court" userId="d42660897f176d1e" providerId="LiveId" clId="{4ADD2832-70EE-475C-B958-C27AE34837E1}" dt="2020-10-11T23:08:47.883" v="3" actId="20577"/>
+        <pc:sldMkLst>
+          <pc:docMk/>
+          <pc:sldMk cId="1674868797" sldId="256"/>
+        </pc:sldMkLst>
+        <pc:spChg chg="mod">
+          <ac:chgData name="Lachlan Court" userId="d42660897f176d1e" providerId="LiveId" clId="{4ADD2832-70EE-475C-B958-C27AE34837E1}" dt="2020-10-11T23:08:47.883" v="3" actId="20577"/>
+          <ac:spMkLst>
+            <pc:docMk/>
+            <pc:sldMk cId="1674868797" sldId="256"/>
+            <ac:spMk id="11" creationId="{63B4AB3E-2992-4B5F-9906-4B2720BF2F49}"/>
+          </ac:spMkLst>
+        </pc:spChg>
+      </pc:sldChg>
+    </pc:docChg>
+  </pc:docChgLst>
 </pc:chgInfo>
 </file>
 
@@ -403,7 +424,7 @@
           <a:p>
             <a:fld id="{40D7545D-A8F8-4D79-A2CC-4F8F6A45DA7B}" type="datetimeFigureOut">
               <a:rPr lang="en-US" smtClean="0"/>
-              <a:t>10/8/2020</a:t>
+              <a:t>10/12/2020</a:t>
             </a:fld>
             <a:endParaRPr lang="en-US"/>
           </a:p>
@@ -601,7 +622,7 @@
           <a:p>
             <a:fld id="{40D7545D-A8F8-4D79-A2CC-4F8F6A45DA7B}" type="datetimeFigureOut">
               <a:rPr lang="en-US" smtClean="0"/>
-              <a:t>10/8/2020</a:t>
+              <a:t>10/12/2020</a:t>
             </a:fld>
             <a:endParaRPr lang="en-US"/>
           </a:p>
@@ -809,7 +830,7 @@
           <a:p>
             <a:fld id="{40D7545D-A8F8-4D79-A2CC-4F8F6A45DA7B}" type="datetimeFigureOut">
               <a:rPr lang="en-US" smtClean="0"/>
-              <a:t>10/8/2020</a:t>
+              <a:t>10/12/2020</a:t>
             </a:fld>
             <a:endParaRPr lang="en-US"/>
           </a:p>
@@ -1007,7 +1028,7 @@
           <a:p>
             <a:fld id="{40D7545D-A8F8-4D79-A2CC-4F8F6A45DA7B}" type="datetimeFigureOut">
               <a:rPr lang="en-US" smtClean="0"/>
-              <a:t>10/8/2020</a:t>
+              <a:t>10/12/2020</a:t>
             </a:fld>
             <a:endParaRPr lang="en-US"/>
           </a:p>
@@ -1282,7 +1303,7 @@
           <a:p>
             <a:fld id="{40D7545D-A8F8-4D79-A2CC-4F8F6A45DA7B}" type="datetimeFigureOut">
               <a:rPr lang="en-US" smtClean="0"/>
-              <a:t>10/8/2020</a:t>
+              <a:t>10/12/2020</a:t>
             </a:fld>
             <a:endParaRPr lang="en-US"/>
           </a:p>
@@ -1547,7 +1568,7 @@
           <a:p>
             <a:fld id="{40D7545D-A8F8-4D79-A2CC-4F8F6A45DA7B}" type="datetimeFigureOut">
               <a:rPr lang="en-US" smtClean="0"/>
-              <a:t>10/8/2020</a:t>
+              <a:t>10/12/2020</a:t>
             </a:fld>
             <a:endParaRPr lang="en-US"/>
           </a:p>
@@ -1959,7 +1980,7 @@
           <a:p>
             <a:fld id="{40D7545D-A8F8-4D79-A2CC-4F8F6A45DA7B}" type="datetimeFigureOut">
               <a:rPr lang="en-US" smtClean="0"/>
-              <a:t>10/8/2020</a:t>
+              <a:t>10/12/2020</a:t>
             </a:fld>
             <a:endParaRPr lang="en-US"/>
           </a:p>
@@ -2100,7 +2121,7 @@
           <a:p>
             <a:fld id="{40D7545D-A8F8-4D79-A2CC-4F8F6A45DA7B}" type="datetimeFigureOut">
               <a:rPr lang="en-US" smtClean="0"/>
-              <a:t>10/8/2020</a:t>
+              <a:t>10/12/2020</a:t>
             </a:fld>
             <a:endParaRPr lang="en-US"/>
           </a:p>
@@ -2213,7 +2234,7 @@
           <a:p>
             <a:fld id="{40D7545D-A8F8-4D79-A2CC-4F8F6A45DA7B}" type="datetimeFigureOut">
               <a:rPr lang="en-US" smtClean="0"/>
-              <a:t>10/8/2020</a:t>
+              <a:t>10/12/2020</a:t>
             </a:fld>
             <a:endParaRPr lang="en-US"/>
           </a:p>
@@ -2524,7 +2545,7 @@
           <a:p>
             <a:fld id="{40D7545D-A8F8-4D79-A2CC-4F8F6A45DA7B}" type="datetimeFigureOut">
               <a:rPr lang="en-US" smtClean="0"/>
-              <a:t>10/8/2020</a:t>
+              <a:t>10/12/2020</a:t>
             </a:fld>
             <a:endParaRPr lang="en-US"/>
           </a:p>
@@ -2812,7 +2833,7 @@
           <a:p>
             <a:fld id="{40D7545D-A8F8-4D79-A2CC-4F8F6A45DA7B}" type="datetimeFigureOut">
               <a:rPr lang="en-US" smtClean="0"/>
-              <a:t>10/8/2020</a:t>
+              <a:t>10/12/2020</a:t>
             </a:fld>
             <a:endParaRPr lang="en-US"/>
           </a:p>
@@ -3053,7 +3074,7 @@
           <a:p>
             <a:fld id="{40D7545D-A8F8-4D79-A2CC-4F8F6A45DA7B}" type="datetimeFigureOut">
               <a:rPr lang="en-US" smtClean="0"/>
-              <a:t>10/8/2020</a:t>
+              <a:t>10/12/2020</a:t>
             </a:fld>
             <a:endParaRPr lang="en-US"/>
           </a:p>
@@ -4046,7 +4067,17 @@
               </a:pPr>
               <a:r>
                 <a:rPr lang="en-US" sz="1000" dirty="0"/>
-                <a:t>draw</a:t>
+                <a:t>Draw</a:t>
+              </a:r>
+            </a:p>
+            <a:p>
+              <a:pPr marL="171450" indent="-171450">
+                <a:buFontTx/>
+                <a:buChar char="-"/>
+              </a:pPr>
+              <a:r>
+                <a:rPr lang="en-US" sz="1000" dirty="0"/>
+                <a:t>&lt;&lt;</a:t>
               </a:r>
             </a:p>
           </p:txBody>

</xml_diff>